<commit_message>
added taura working slides
</commit_message>
<xml_diff>
--- a/events/2022-03-16/slides/01-rules.pptx
+++ b/events/2022-03-16/slides/01-rules.pptx
@@ -53109,7 +53109,7 @@
           <a:p>
             <a:r>
               <a:rPr kumimoji="1" lang="en-US" altLang="ja-JP"/>
-              <a:t>2021/9/15</a:t>
+              <a:t>2022/3/16</a:t>
             </a:r>
             <a:endParaRPr kumimoji="1" lang="ja-JP" altLang="en-US"/>
           </a:p>
@@ -53175,6 +53175,43 @@
               <a:rPr lang="ja-JP" altLang="en-US" sz="1400" dirty="0"/>
               <a:t>一般社団法人授業目的公衆送信補償金等管理協会</a:t>
             </a:r>
+          </a:p>
+        </p:txBody>
+      </p:sp>
+      <p:sp>
+        <p:nvSpPr>
+          <p:cNvPr id="5" name="フッター プレースホルダー 4">
+            <a:extLst>
+              <a:ext uri="{FF2B5EF4-FFF2-40B4-BE49-F238E27FC236}">
+                <a16:creationId xmlns:a16="http://schemas.microsoft.com/office/drawing/2014/main" id="{6AAD55DB-142B-4BDC-975D-3B8A2B99B892}"/>
+              </a:ext>
+            </a:extLst>
+          </p:cNvPr>
+          <p:cNvSpPr>
+            <a:spLocks noGrp="1"/>
+          </p:cNvSpPr>
+          <p:nvPr>
+            <p:ph type="ftr" sz="quarter" idx="11"/>
+          </p:nvPr>
+        </p:nvSpPr>
+        <p:spPr/>
+        <p:txBody>
+          <a:bodyPr/>
+          <a:lstStyle/>
+          <a:p>
+            <a:r>
+              <a:rPr kumimoji="1" lang="en-US" altLang="ja-JP"/>
+              <a:t>2022 S</a:t>
+            </a:r>
+            <a:r>
+              <a:rPr kumimoji="1" lang="ja-JP" altLang="en-US"/>
+              <a:t>セメスタ 説明会 </a:t>
+            </a:r>
+            <a:r>
+              <a:rPr kumimoji="1" lang="en-US" altLang="ja-JP"/>
+              <a:t>https://utelecon.adm.u-tokyo.ac.jp/</a:t>
+            </a:r>
+            <a:endParaRPr kumimoji="1" lang="ja-JP" altLang="en-US"/>
           </a:p>
         </p:txBody>
       </p:sp>

</xml_diff>